<commit_message>
POPL: revised an error in ppt.
</commit_message>
<xml_diff>
--- a/courses/popl/slides/POPL-Review02.pptx
+++ b/courses/popl/slides/POPL-Review02.pptx
@@ -3548,7 +3548,7 @@
         <a:spcAft>
           <a:spcPts val="1000"/>
         </a:spcAft>
-        <a:buFont typeface="Arial" panose="02080604020202020204" pitchFamily="34" charset="0"/>
+        <a:buFont typeface="Arial" panose="020B0604020202020204" pitchFamily="34" charset="0"/>
         <a:buChar char="●"/>
         <a:defRPr sz="1800" u="none" strike="noStrike" kern="1200" cap="none" spc="150" normalizeH="0" baseline="0">
           <a:solidFill>
@@ -3573,7 +3573,7 @@
         <a:spcAft>
           <a:spcPts val="600"/>
         </a:spcAft>
-        <a:buFont typeface="Arial" panose="02080604020202020204" pitchFamily="34" charset="0"/>
+        <a:buFont typeface="Arial" panose="020B0604020202020204" pitchFamily="34" charset="0"/>
         <a:buChar char="●"/>
         <a:tabLst>
           <a:tab pos="1609725" algn="l"/>
@@ -3604,7 +3604,7 @@
         <a:spcAft>
           <a:spcPts val="600"/>
         </a:spcAft>
-        <a:buFont typeface="Arial" panose="02080604020202020204" pitchFamily="34" charset="0"/>
+        <a:buFont typeface="Arial" panose="020B0604020202020204" pitchFamily="34" charset="0"/>
         <a:buChar char="●"/>
         <a:defRPr sz="1600" u="none" strike="noStrike" kern="1200" cap="none" spc="150" normalizeH="0" baseline="0">
           <a:solidFill>
@@ -3654,7 +3654,7 @@
         <a:spcAft>
           <a:spcPts val="300"/>
         </a:spcAft>
-        <a:buFont typeface="Arial" panose="02080604020202020204" pitchFamily="34" charset="0"/>
+        <a:buFont typeface="Arial" panose="020B0604020202020204" pitchFamily="34" charset="0"/>
         <a:buChar char="•"/>
         <a:defRPr sz="1400" u="none" strike="noStrike" kern="1200" cap="none" spc="150" normalizeH="0" baseline="0">
           <a:solidFill>
@@ -3676,7 +3676,7 @@
         <a:spcBef>
           <a:spcPts val="500"/>
         </a:spcBef>
-        <a:buFont typeface="Arial" panose="02080604020202020204" pitchFamily="34" charset="0"/>
+        <a:buFont typeface="Arial" panose="020B0604020202020204" pitchFamily="34" charset="0"/>
         <a:buChar char="•"/>
         <a:defRPr sz="1800" kern="1200">
           <a:solidFill>
@@ -3694,7 +3694,7 @@
         <a:spcBef>
           <a:spcPts val="500"/>
         </a:spcBef>
-        <a:buFont typeface="Arial" panose="02080604020202020204" pitchFamily="34" charset="0"/>
+        <a:buFont typeface="Arial" panose="020B0604020202020204" pitchFamily="34" charset="0"/>
         <a:buChar char="•"/>
         <a:defRPr sz="1800" kern="1200">
           <a:solidFill>
@@ -3712,7 +3712,7 @@
         <a:spcBef>
           <a:spcPts val="500"/>
         </a:spcBef>
-        <a:buFont typeface="Arial" panose="02080604020202020204" pitchFamily="34" charset="0"/>
+        <a:buFont typeface="Arial" panose="020B0604020202020204" pitchFamily="34" charset="0"/>
         <a:buChar char="•"/>
         <a:defRPr sz="1800" kern="1200">
           <a:solidFill>
@@ -3730,7 +3730,7 @@
         <a:spcBef>
           <a:spcPts val="500"/>
         </a:spcBef>
-        <a:buFont typeface="Arial" panose="02080604020202020204" pitchFamily="34" charset="0"/>
+        <a:buFont typeface="Arial" panose="020B0604020202020204" pitchFamily="34" charset="0"/>
         <a:buChar char="•"/>
         <a:defRPr sz="1800" kern="1200">
           <a:solidFill>
@@ -5514,7 +5514,7 @@
               <a:lnSpc>
                 <a:spcPct val="180000"/>
               </a:lnSpc>
-              <a:buFont typeface="Arial" panose="02080604020202020204" pitchFamily="34" charset="0"/>
+              <a:buFont typeface="Arial" panose="020B0604020202020204" pitchFamily="34" charset="0"/>
               <a:buNone/>
             </a:pPr>
             <a:r>
@@ -6543,7 +6543,7 @@
               <a:lnSpc>
                 <a:spcPct val="160000"/>
               </a:lnSpc>
-              <a:buFont typeface="Arial" panose="02080604020202020204" pitchFamily="34" charset="0"/>
+              <a:buFont typeface="Arial" panose="020B0604020202020204" pitchFamily="34" charset="0"/>
               <a:buChar char="•"/>
             </a:pPr>
             <a:r>
@@ -6561,7 +6561,7 @@
               <a:lnSpc>
                 <a:spcPct val="160000"/>
               </a:lnSpc>
-              <a:buFont typeface="Arial" panose="02080604020202020204" pitchFamily="34" charset="0"/>
+              <a:buFont typeface="Arial" panose="020B0604020202020204" pitchFamily="34" charset="0"/>
               <a:buChar char="•"/>
             </a:pPr>
             <a:r>
@@ -6579,7 +6579,7 @@
               <a:lnSpc>
                 <a:spcPct val="160000"/>
               </a:lnSpc>
-              <a:buFont typeface="Arial" panose="02080604020202020204" pitchFamily="34" charset="0"/>
+              <a:buFont typeface="Arial" panose="020B0604020202020204" pitchFamily="34" charset="0"/>
               <a:buChar char="•"/>
             </a:pPr>
             <a:r>
@@ -6804,7 +6804,7 @@
               <a:lnSpc>
                 <a:spcPct val="190000"/>
               </a:lnSpc>
-              <a:buFont typeface="Arial" panose="02080604020202020204" pitchFamily="34" charset="0"/>
+              <a:buFont typeface="Arial" panose="020B0604020202020204" pitchFamily="34" charset="0"/>
               <a:buChar char="•"/>
             </a:pPr>
             <a:r>
@@ -6838,7 +6838,7 @@
               <a:lnSpc>
                 <a:spcPct val="190000"/>
               </a:lnSpc>
-              <a:buFont typeface="Arial" panose="02080604020202020204" pitchFamily="34" charset="0"/>
+              <a:buFont typeface="Arial" panose="020B0604020202020204" pitchFamily="34" charset="0"/>
               <a:buChar char="•"/>
             </a:pPr>
             <a:r>
@@ -7135,7 +7135,7 @@
               <a:lnSpc>
                 <a:spcPct val="190000"/>
               </a:lnSpc>
-              <a:buFont typeface="Arial" panose="02080604020202020204" pitchFamily="34" charset="0"/>
+              <a:buFont typeface="Arial" panose="020B0604020202020204" pitchFamily="34" charset="0"/>
               <a:buChar char="•"/>
             </a:pPr>
             <a:r>
@@ -7161,7 +7161,7 @@
               <a:lnSpc>
                 <a:spcPct val="190000"/>
               </a:lnSpc>
-              <a:buFont typeface="Arial" panose="02080604020202020204" pitchFamily="34" charset="0"/>
+              <a:buFont typeface="Arial" panose="020B0604020202020204" pitchFamily="34" charset="0"/>
               <a:buChar char="•"/>
             </a:pPr>
             <a:r>
@@ -7195,7 +7195,7 @@
               <a:lnSpc>
                 <a:spcPct val="190000"/>
               </a:lnSpc>
-              <a:buFont typeface="Arial" panose="02080604020202020204" pitchFamily="34" charset="0"/>
+              <a:buFont typeface="Arial" panose="020B0604020202020204" pitchFamily="34" charset="0"/>
               <a:buChar char="•"/>
             </a:pPr>
             <a:r>
@@ -7428,7 +7428,7 @@
               <a:spcAft>
                 <a:spcPts val="1000"/>
               </a:spcAft>
-              <a:buFont typeface="Arial" panose="02080604020202020204" pitchFamily="34" charset="0"/>
+              <a:buFont typeface="Arial" panose="020B0604020202020204" pitchFamily="34" charset="0"/>
               <a:buChar char="●"/>
               <a:defRPr sz="1800" u="none" strike="noStrike" kern="1200" cap="none" spc="150" normalizeH="0" baseline="0">
                 <a:solidFill>
@@ -7453,7 +7453,7 @@
               <a:spcAft>
                 <a:spcPts val="600"/>
               </a:spcAft>
-              <a:buFont typeface="Arial" panose="02080604020202020204" pitchFamily="34" charset="0"/>
+              <a:buFont typeface="Arial" panose="020B0604020202020204" pitchFamily="34" charset="0"/>
               <a:buChar char="●"/>
               <a:tabLst>
                 <a:tab pos="1609725" algn="l"/>
@@ -7484,7 +7484,7 @@
               <a:spcAft>
                 <a:spcPts val="600"/>
               </a:spcAft>
-              <a:buFont typeface="Arial" panose="02080604020202020204" pitchFamily="34" charset="0"/>
+              <a:buFont typeface="Arial" panose="020B0604020202020204" pitchFamily="34" charset="0"/>
               <a:buChar char="●"/>
               <a:defRPr sz="1600" u="none" strike="noStrike" kern="1200" cap="none" spc="150" normalizeH="0" baseline="0">
                 <a:solidFill>
@@ -7534,7 +7534,7 @@
               <a:spcAft>
                 <a:spcPts val="300"/>
               </a:spcAft>
-              <a:buFont typeface="Arial" panose="02080604020202020204" pitchFamily="34" charset="0"/>
+              <a:buFont typeface="Arial" panose="020B0604020202020204" pitchFamily="34" charset="0"/>
               <a:buChar char="•"/>
               <a:defRPr sz="1400" u="none" strike="noStrike" kern="1200" cap="none" spc="150" normalizeH="0" baseline="0">
                 <a:solidFill>
@@ -7556,7 +7556,7 @@
               <a:spcBef>
                 <a:spcPts val="500"/>
               </a:spcBef>
-              <a:buFont typeface="Arial" panose="02080604020202020204" pitchFamily="34" charset="0"/>
+              <a:buFont typeface="Arial" panose="020B0604020202020204" pitchFamily="34" charset="0"/>
               <a:buChar char="•"/>
               <a:defRPr sz="1800" kern="1200">
                 <a:solidFill>
@@ -7574,7 +7574,7 @@
               <a:spcBef>
                 <a:spcPts val="500"/>
               </a:spcBef>
-              <a:buFont typeface="Arial" panose="02080604020202020204" pitchFamily="34" charset="0"/>
+              <a:buFont typeface="Arial" panose="020B0604020202020204" pitchFamily="34" charset="0"/>
               <a:buChar char="•"/>
               <a:defRPr sz="1800" kern="1200">
                 <a:solidFill>
@@ -7592,7 +7592,7 @@
               <a:spcBef>
                 <a:spcPts val="500"/>
               </a:spcBef>
-              <a:buFont typeface="Arial" panose="02080604020202020204" pitchFamily="34" charset="0"/>
+              <a:buFont typeface="Arial" panose="020B0604020202020204" pitchFamily="34" charset="0"/>
               <a:buChar char="•"/>
               <a:defRPr sz="1800" kern="1200">
                 <a:solidFill>
@@ -7610,7 +7610,7 @@
               <a:spcBef>
                 <a:spcPts val="500"/>
               </a:spcBef>
-              <a:buFont typeface="Arial" panose="02080604020202020204" pitchFamily="34" charset="0"/>
+              <a:buFont typeface="Arial" panose="020B0604020202020204" pitchFamily="34" charset="0"/>
               <a:buChar char="•"/>
               <a:defRPr sz="1800" kern="1200">
                 <a:solidFill>
@@ -9206,7 +9206,7 @@
                 <a:latin typeface="Courier New" panose="02070309020205020404" charset="0"/>
                 <a:cs typeface="Courier New" panose="02070309020205020404" charset="0"/>
               </a:rPr>
-              <a:t>        Bool   Nat</a:t>
+              <a:t>        Bool   Bool</a:t>
             </a:r>
             <a:endParaRPr lang="en-US" altLang="zh-CN" sz="2800" b="1">
               <a:solidFill>

</xml_diff>